<commit_message>
finish intro to crime slides
</commit_message>
<xml_diff>
--- a/slides/ppslides/05-EconomicsofCrime.pptx
+++ b/slides/ppslides/05-EconomicsofCrime.pptx
@@ -157,214 +157,6 @@
 </p:presentation>
 </file>
 
-<file path=ppt/ink/ink1.xml><?xml version="1.0" encoding="utf-8"?>
-<inkml:ink xmlns:inkml="http://www.w3.org/2003/InkML">
-  <inkml:definitions>
-    <inkml:context xml:id="ctx0">
-      <inkml:inkSource xml:id="inkSrc0">
-        <inkml:traceFormat>
-          <inkml:channel name="X" type="integer" min="-2.14748E9" max="2.14748E9" units="cm"/>
-          <inkml:channel name="Y" type="integer" min="-2.14748E9" max="2.14748E9" units="cm"/>
-        </inkml:traceFormat>
-        <inkml:channelProperties>
-          <inkml:channelProperty channel="X" name="resolution" value="1000" units="1/cm"/>
-          <inkml:channelProperty channel="Y" name="resolution" value="1000" units="1/cm"/>
-        </inkml:channelProperties>
-      </inkml:inkSource>
-      <inkml:timestamp xml:id="ts0" timeString="2020-11-02T14:09:10.406"/>
-    </inkml:context>
-    <inkml:brush xml:id="br0">
-      <inkml:brushProperty name="width" value="0.05" units="cm"/>
-      <inkml:brushProperty name="height" value="0.05" units="cm"/>
-      <inkml:brushProperty name="ignorePressure" value="1"/>
-    </inkml:brush>
-  </inkml:definitions>
-  <inkml:trace contextRef="#ctx0" brushRef="#br0">3437 1,'-560'273,"-185"99,35-4,137-57,167-77,152-68,119-59,83-44,50-26,25-21</inkml:trace>
-</inkml:ink>
-</file>
-
-<file path=ppt/ink/ink2.xml><?xml version="1.0" encoding="utf-8"?>
-<inkml:ink xmlns:inkml="http://www.w3.org/2003/InkML">
-  <inkml:definitions>
-    <inkml:context xml:id="ctx0">
-      <inkml:inkSource xml:id="inkSrc0">
-        <inkml:traceFormat>
-          <inkml:channel name="X" type="integer" min="-2.14748E9" max="2.14748E9" units="cm"/>
-          <inkml:channel name="Y" type="integer" min="-2.14748E9" max="2.14748E9" units="cm"/>
-        </inkml:traceFormat>
-        <inkml:channelProperties>
-          <inkml:channelProperty channel="X" name="resolution" value="1000" units="1/cm"/>
-          <inkml:channelProperty channel="Y" name="resolution" value="1000" units="1/cm"/>
-        </inkml:channelProperties>
-      </inkml:inkSource>
-      <inkml:timestamp xml:id="ts0" timeString="2020-11-02T14:09:12.237"/>
-    </inkml:context>
-    <inkml:brush xml:id="br0">
-      <inkml:brushProperty name="width" value="0.05" units="cm"/>
-      <inkml:brushProperty name="height" value="0.05" units="cm"/>
-      <inkml:brushProperty name="ignorePressure" value="1"/>
-    </inkml:brush>
-  </inkml:definitions>
-  <inkml:trace contextRef="#ctx0" brushRef="#br0">0 1,'0'990,"1"-973,0 0,0 0,2 0,0 0,10 29,3-6,21 40,-34-74,2 4,5 9,-1 0,2-1,18 24,-27-39,1 1,-1-1,1 0,-1-1,1 1,0 0,0-1,0 0,0 0,0 0,1 0,-1 0,1 0,-1-1,1 0,0 0,-1 0,1 0,0 0,0-1,-1 0,1 0,0 0,0 0,0 0,5-2,13-7,-1 0,1-2,35-24,2-1,-52 32,312-182,-251 142,-3-3,94-90,-6-11,-149 145,-1-1,0 0,0 0,0 0,0 0,-1-1,3-4,1-9</inkml:trace>
-</inkml:ink>
-</file>
-
-<file path=ppt/ink/ink3.xml><?xml version="1.0" encoding="utf-8"?>
-<inkml:ink xmlns:inkml="http://www.w3.org/2003/InkML">
-  <inkml:definitions>
-    <inkml:context xml:id="ctx0">
-      <inkml:inkSource xml:id="inkSrc0">
-        <inkml:traceFormat>
-          <inkml:channel name="X" type="integer" min="-2.14748E9" max="2.14748E9" units="cm"/>
-          <inkml:channel name="Y" type="integer" min="-2.14748E9" max="2.14748E9" units="cm"/>
-        </inkml:traceFormat>
-        <inkml:channelProperties>
-          <inkml:channelProperty channel="X" name="resolution" value="1000" units="1/cm"/>
-          <inkml:channelProperty channel="Y" name="resolution" value="1000" units="1/cm"/>
-        </inkml:channelProperties>
-      </inkml:inkSource>
-      <inkml:timestamp xml:id="ts0" timeString="2020-11-02T14:09:14.306"/>
-    </inkml:context>
-    <inkml:brush xml:id="br0">
-      <inkml:brushProperty name="width" value="0.05" units="cm"/>
-      <inkml:brushProperty name="height" value="0.05" units="cm"/>
-      <inkml:brushProperty name="ignorePressure" value="1"/>
-    </inkml:brush>
-  </inkml:definitions>
-  <inkml:trace contextRef="#ctx0" brushRef="#br0">1 0,'0'2,"1"-1,-1 0,1 1,-1-1,1 0,-1 1,1-1,0 0,0 0,0 0,0 0,0 0,0 0,0 0,0 0,0 0,0 0,0 0,3 1,29 13,-27-12,97 35,155 36,53 18,-217-55,-2 5,152 93,-232-127,-1 1,0 0,0 1,-1 1,0-1,-1 2,13 18,45 95,-42-74,394 696,-282-512,-89-143,40 110,-30-65,-15-43,-18-45,-2 2,-3 1,24 94,-30-54,-5 0,-4 158,-5-219,-1-6</inkml:trace>
-</inkml:ink>
-</file>
-
-<file path=ppt/ink/ink4.xml><?xml version="1.0" encoding="utf-8"?>
-<inkml:ink xmlns:inkml="http://www.w3.org/2003/InkML">
-  <inkml:definitions>
-    <inkml:context xml:id="ctx0">
-      <inkml:inkSource xml:id="inkSrc0">
-        <inkml:traceFormat>
-          <inkml:channel name="X" type="integer" min="-2.14748E9" max="2.14748E9" units="cm"/>
-          <inkml:channel name="Y" type="integer" min="-2.14748E9" max="2.14748E9" units="cm"/>
-        </inkml:traceFormat>
-        <inkml:channelProperties>
-          <inkml:channelProperty channel="X" name="resolution" value="1000" units="1/cm"/>
-          <inkml:channelProperty channel="Y" name="resolution" value="1000" units="1/cm"/>
-        </inkml:channelProperties>
-      </inkml:inkSource>
-      <inkml:timestamp xml:id="ts0" timeString="2020-11-02T14:09:15.684"/>
-    </inkml:context>
-    <inkml:brush xml:id="br0">
-      <inkml:brushProperty name="width" value="0.05" units="cm"/>
-      <inkml:brushProperty name="height" value="0.05" units="cm"/>
-      <inkml:brushProperty name="ignorePressure" value="1"/>
-    </inkml:brush>
-  </inkml:definitions>
-  <inkml:trace contextRef="#ctx0" brushRef="#br0">1 1,'135'114,"-6"-6,-51-42,-54-48,-1 1,38 41,-55-51,0 0,-1 0,0 0,5 16,20 32,-10-33,1-1,1-1,1-1,39 28,-60-47,0-1,-1 0,1 0,0 0,0-1,0 1,-1 0,1-1,0 1,0-1,0 0,0 1,0-1,0 0,0 0,0-1,0 1,0 0,0 0,0-1,0 0,0 1,0-1,-1 0,1 0,0 0,0 0,-1 0,1 0,-1 0,1 0,1-3,6-5,-1 0,0 0,-1-1,8-14,-3 5,37-44,2 2,3 2,3 3,1 2,4 3,94-61,-150 109,-1-1,0 1,0-1,-1 1,1-1,-1-1,0 1,0-1,0 1,0-1,-1 0,3-7,-1-5</inkml:trace>
-</inkml:ink>
-</file>
-
-<file path=ppt/ink/ink5.xml><?xml version="1.0" encoding="utf-8"?>
-<inkml:ink xmlns:inkml="http://www.w3.org/2003/InkML">
-  <inkml:definitions>
-    <inkml:context xml:id="ctx0">
-      <inkml:inkSource xml:id="inkSrc0">
-        <inkml:traceFormat>
-          <inkml:channel name="X" type="integer" min="-2.14748E9" max="2.14748E9" units="cm"/>
-          <inkml:channel name="Y" type="integer" min="-2.14748E9" max="2.14748E9" units="cm"/>
-        </inkml:traceFormat>
-        <inkml:channelProperties>
-          <inkml:channelProperty channel="X" name="resolution" value="1000" units="1/cm"/>
-          <inkml:channelProperty channel="Y" name="resolution" value="1000" units="1/cm"/>
-        </inkml:channelProperties>
-      </inkml:inkSource>
-      <inkml:timestamp xml:id="ts0" timeString="2020-11-02T14:09:10.406"/>
-    </inkml:context>
-    <inkml:brush xml:id="br0">
-      <inkml:brushProperty name="width" value="0.05" units="cm"/>
-      <inkml:brushProperty name="height" value="0.05" units="cm"/>
-      <inkml:brushProperty name="ignorePressure" value="1"/>
-    </inkml:brush>
-  </inkml:definitions>
-  <inkml:trace contextRef="#ctx0" brushRef="#br0">3437 1,'-560'273,"-185"99,35-4,137-57,167-77,152-68,119-59,83-44,50-26,25-21</inkml:trace>
-</inkml:ink>
-</file>
-
-<file path=ppt/ink/ink6.xml><?xml version="1.0" encoding="utf-8"?>
-<inkml:ink xmlns:inkml="http://www.w3.org/2003/InkML">
-  <inkml:definitions>
-    <inkml:context xml:id="ctx0">
-      <inkml:inkSource xml:id="inkSrc0">
-        <inkml:traceFormat>
-          <inkml:channel name="X" type="integer" min="-2.14748E9" max="2.14748E9" units="cm"/>
-          <inkml:channel name="Y" type="integer" min="-2.14748E9" max="2.14748E9" units="cm"/>
-        </inkml:traceFormat>
-        <inkml:channelProperties>
-          <inkml:channelProperty channel="X" name="resolution" value="1000" units="1/cm"/>
-          <inkml:channelProperty channel="Y" name="resolution" value="1000" units="1/cm"/>
-        </inkml:channelProperties>
-      </inkml:inkSource>
-      <inkml:timestamp xml:id="ts0" timeString="2020-11-02T14:09:12.237"/>
-    </inkml:context>
-    <inkml:brush xml:id="br0">
-      <inkml:brushProperty name="width" value="0.05" units="cm"/>
-      <inkml:brushProperty name="height" value="0.05" units="cm"/>
-      <inkml:brushProperty name="ignorePressure" value="1"/>
-    </inkml:brush>
-  </inkml:definitions>
-  <inkml:trace contextRef="#ctx0" brushRef="#br0">0 1,'0'990,"1"-973,0 0,0 0,2 0,0 0,10 29,3-6,21 40,-34-74,2 4,5 9,-1 0,2-1,18 24,-27-39,1 1,-1-1,1 0,-1-1,1 1,0 0,0-1,0 0,0 0,0 0,1 0,-1 0,1 0,-1-1,1 0,0 0,-1 0,1 0,0 0,0-1,-1 0,1 0,0 0,0 0,0 0,5-2,13-7,-1 0,1-2,35-24,2-1,-52 32,312-182,-251 142,-3-3,94-90,-6-11,-149 145,-1-1,0 0,0 0,0 0,0 0,-1-1,3-4,1-9</inkml:trace>
-</inkml:ink>
-</file>
-
-<file path=ppt/ink/ink7.xml><?xml version="1.0" encoding="utf-8"?>
-<inkml:ink xmlns:inkml="http://www.w3.org/2003/InkML">
-  <inkml:definitions>
-    <inkml:context xml:id="ctx0">
-      <inkml:inkSource xml:id="inkSrc0">
-        <inkml:traceFormat>
-          <inkml:channel name="X" type="integer" min="-2.14748E9" max="2.14748E9" units="cm"/>
-          <inkml:channel name="Y" type="integer" min="-2.14748E9" max="2.14748E9" units="cm"/>
-        </inkml:traceFormat>
-        <inkml:channelProperties>
-          <inkml:channelProperty channel="X" name="resolution" value="1000" units="1/cm"/>
-          <inkml:channelProperty channel="Y" name="resolution" value="1000" units="1/cm"/>
-        </inkml:channelProperties>
-      </inkml:inkSource>
-      <inkml:timestamp xml:id="ts0" timeString="2020-11-02T14:09:14.306"/>
-    </inkml:context>
-    <inkml:brush xml:id="br0">
-      <inkml:brushProperty name="width" value="0.05" units="cm"/>
-      <inkml:brushProperty name="height" value="0.05" units="cm"/>
-      <inkml:brushProperty name="ignorePressure" value="1"/>
-    </inkml:brush>
-  </inkml:definitions>
-  <inkml:trace contextRef="#ctx0" brushRef="#br0">1 0,'0'2,"1"-1,-1 0,1 1,-1-1,1 0,-1 1,1-1,0 0,0 0,0 0,0 0,0 0,0 0,0 0,0 0,0 0,0 0,0 0,3 1,29 13,-27-12,97 35,155 36,53 18,-217-55,-2 5,152 93,-232-127,-1 1,0 0,0 1,-1 1,0-1,-1 2,13 18,45 95,-42-74,394 696,-282-512,-89-143,40 110,-30-65,-15-43,-18-45,-2 2,-3 1,24 94,-30-54,-5 0,-4 158,-5-219,-1-6</inkml:trace>
-</inkml:ink>
-</file>
-
-<file path=ppt/ink/ink8.xml><?xml version="1.0" encoding="utf-8"?>
-<inkml:ink xmlns:inkml="http://www.w3.org/2003/InkML">
-  <inkml:definitions>
-    <inkml:context xml:id="ctx0">
-      <inkml:inkSource xml:id="inkSrc0">
-        <inkml:traceFormat>
-          <inkml:channel name="X" type="integer" min="-2.14748E9" max="2.14748E9" units="cm"/>
-          <inkml:channel name="Y" type="integer" min="-2.14748E9" max="2.14748E9" units="cm"/>
-        </inkml:traceFormat>
-        <inkml:channelProperties>
-          <inkml:channelProperty channel="X" name="resolution" value="1000" units="1/cm"/>
-          <inkml:channelProperty channel="Y" name="resolution" value="1000" units="1/cm"/>
-        </inkml:channelProperties>
-      </inkml:inkSource>
-      <inkml:timestamp xml:id="ts0" timeString="2020-11-02T14:09:15.684"/>
-    </inkml:context>
-    <inkml:brush xml:id="br0">
-      <inkml:brushProperty name="width" value="0.05" units="cm"/>
-      <inkml:brushProperty name="height" value="0.05" units="cm"/>
-      <inkml:brushProperty name="ignorePressure" value="1"/>
-    </inkml:brush>
-  </inkml:definitions>
-  <inkml:trace contextRef="#ctx0" brushRef="#br0">1 1,'135'114,"-6"-6,-51-42,-54-48,-1 1,38 41,-55-51,0 0,-1 0,0 0,5 16,20 32,-10-33,1-1,1-1,1-1,39 28,-60-47,0-1,-1 0,1 0,0 0,0-1,0 1,-1 0,1-1,0 1,0-1,0 0,0 1,0-1,0 0,0 0,0-1,0 1,0 0,0 0,0-1,0 0,0 1,0-1,-1 0,1 0,0 0,0 0,-1 0,1 0,-1 0,1 0,1-3,6-5,-1 0,0 0,-1-1,8-14,-3 5,37-44,2 2,3 2,3 3,1 2,4 3,94-61,-150 109,-1-1,0 1,0-1,-1 1,1-1,-1-1,0 1,0-1,0 1,0-1,-1 0,3-7,-1-5</inkml:trace>
-</inkml:ink>
-</file>
-
 <file path=ppt/slideLayouts/slideLayout1.xml><?xml version="1.0" encoding="utf-8"?>
 <p:sldLayout xmlns:a="http://schemas.openxmlformats.org/drawingml/2006/main" xmlns:r="http://schemas.openxmlformats.org/officeDocument/2006/relationships" xmlns:p="http://schemas.openxmlformats.org/presentationml/2006/main" showMasterSp="0" type="title" preserve="1">
   <p:cSld name="Title Slide">
@@ -591,7 +383,7 @@
           <a:p>
             <a:fld id="{4BDF68E2-58F2-4D09-BE8B-E3BD06533059}" type="datetimeFigureOut">
               <a:rPr lang="en-US" dirty="0"/>
-              <a:t>2/13/24</a:t>
+              <a:t>2/15/24</a:t>
             </a:fld>
             <a:endParaRPr lang="en-US" dirty="0"/>
           </a:p>
@@ -794,7 +586,7 @@
           <a:p>
             <a:fld id="{2E2D6473-DF6D-4702-B328-E0DD40540A4E}" type="datetimeFigureOut">
               <a:rPr lang="en-US" dirty="0"/>
-              <a:t>2/13/24</a:t>
+              <a:t>2/15/24</a:t>
             </a:fld>
             <a:endParaRPr lang="en-US" dirty="0"/>
           </a:p>
@@ -1045,7 +837,7 @@
           <a:p>
             <a:fld id="{E26F7E3A-B166-407D-9866-32884E7D5B37}" type="datetimeFigureOut">
               <a:rPr lang="en-US" dirty="0"/>
-              <a:t>2/13/24</a:t>
+              <a:t>2/15/24</a:t>
             </a:fld>
             <a:endParaRPr lang="en-US" dirty="0"/>
           </a:p>
@@ -1214,7 +1006,7 @@
           <a:p>
             <a:fld id="{528FC5F6-F338-4AE4-BB23-26385BCFC423}" type="datetimeFigureOut">
               <a:rPr lang="en-US" dirty="0"/>
-              <a:t>2/13/24</a:t>
+              <a:t>2/15/24</a:t>
             </a:fld>
             <a:endParaRPr lang="en-US" dirty="0"/>
           </a:p>
@@ -1552,7 +1344,7 @@
           <a:p>
             <a:fld id="{20EBB0C4-6273-4C6E-B9BD-2EDC30F1CD52}" type="datetimeFigureOut">
               <a:rPr lang="en-US" dirty="0"/>
-              <a:t>2/13/24</a:t>
+              <a:t>2/15/24</a:t>
             </a:fld>
             <a:endParaRPr lang="en-US" dirty="0"/>
           </a:p>
@@ -1822,7 +1614,7 @@
           <a:p>
             <a:fld id="{19AB4D41-86C1-4908-B66A-0B50CEB3BF29}" type="datetimeFigureOut">
               <a:rPr lang="en-US" dirty="0"/>
-              <a:t>2/13/24</a:t>
+              <a:t>2/15/24</a:t>
             </a:fld>
             <a:endParaRPr lang="en-US" dirty="0"/>
           </a:p>
@@ -2196,7 +1988,7 @@
           <a:p>
             <a:fld id="{E6426E2C-56C1-4E0D-A793-0088A7FDD37E}" type="datetimeFigureOut">
               <a:rPr lang="en-US" dirty="0"/>
-              <a:t>2/13/24</a:t>
+              <a:t>2/15/24</a:t>
             </a:fld>
             <a:endParaRPr lang="en-US" dirty="0"/>
           </a:p>
@@ -2309,7 +2101,7 @@
           <a:p>
             <a:fld id="{C8C39B41-D8B5-4052-B551-9B5525EAA8B6}" type="datetimeFigureOut">
               <a:rPr lang="en-US" dirty="0"/>
-              <a:t>2/13/24</a:t>
+              <a:t>2/15/24</a:t>
             </a:fld>
             <a:endParaRPr lang="en-US" dirty="0"/>
           </a:p>
@@ -2475,7 +2267,7 @@
           <a:p>
             <a:fld id="{4D94136C-8742-45B2-AF27-D93DF72833A9}" type="datetimeFigureOut">
               <a:rPr lang="en-US" dirty="0"/>
-              <a:t>2/13/24</a:t>
+              <a:t>2/15/24</a:t>
             </a:fld>
             <a:endParaRPr lang="en-US" dirty="0"/>
           </a:p>
@@ -2825,7 +2617,7 @@
           <a:p>
             <a:fld id="{32ABBEA6-7C60-4B02-AE87-00D78D8422AF}" type="datetimeFigureOut">
               <a:rPr lang="en-US" dirty="0"/>
-              <a:t>2/13/24</a:t>
+              <a:t>2/15/24</a:t>
             </a:fld>
             <a:endParaRPr lang="en-US" dirty="0"/>
           </a:p>
@@ -3203,7 +2995,7 @@
           <a:p>
             <a:fld id="{C9CAD897-D46E-4AD2-BD9B-49DD3E640873}" type="datetimeFigureOut">
               <a:rPr lang="en-US" dirty="0"/>
-              <a:t>2/13/24</a:t>
+              <a:t>2/15/24</a:t>
             </a:fld>
             <a:endParaRPr lang="en-US" dirty="0"/>
           </a:p>
@@ -3485,7 +3277,7 @@
           <a:p>
             <a:fld id="{98624D31-43A5-475A-80CF-332C9F6DCF35}" type="datetimeFigureOut">
               <a:rPr lang="en-US" dirty="0"/>
-              <a:t>2/13/24</a:t>
+              <a:t>2/15/24</a:t>
             </a:fld>
             <a:endParaRPr lang="en-US" dirty="0"/>
           </a:p>
@@ -4064,13 +3856,8 @@
           <a:p>
             <a:r>
               <a:rPr lang="en-US" dirty="0"/>
-              <a:t>Professor </a:t>
-            </a:r>
-            <a:r>
-              <a:rPr lang="en-US"/>
-              <a:t>Hussain Hadah</a:t>
-            </a:r>
-            <a:endParaRPr lang="en-US" dirty="0"/>
+              <a:t>Professor Hussain Hadah</a:t>
+            </a:r>
           </a:p>
         </p:txBody>
       </p:sp>
@@ -10499,252 +10286,6 @@
           </a:extLst>
         </p:spPr>
       </p:pic>
-      <p:grpSp>
-        <p:nvGrpSpPr>
-          <p:cNvPr id="8" name="Group 7">
-            <a:extLst>
-              <a:ext uri="{FF2B5EF4-FFF2-40B4-BE49-F238E27FC236}">
-                <a16:creationId xmlns:a16="http://schemas.microsoft.com/office/drawing/2014/main" id="{8A47D6CB-F4D3-4C79-9F92-649AD5EEED3B}"/>
-              </a:ext>
-            </a:extLst>
-          </p:cNvPr>
-          <p:cNvGrpSpPr/>
-          <p:nvPr/>
-        </p:nvGrpSpPr>
-        <p:grpSpPr>
-          <a:xfrm>
-            <a:off x="3172438" y="1053676"/>
-            <a:ext cx="1474560" cy="1026000"/>
-            <a:chOff x="3172438" y="1053676"/>
-            <a:chExt cx="1474560" cy="1026000"/>
-          </a:xfrm>
-        </p:grpSpPr>
-        <mc:AlternateContent xmlns:mc="http://schemas.openxmlformats.org/markup-compatibility/2006" xmlns:p14="http://schemas.microsoft.com/office/powerpoint/2010/main">
-          <mc:Choice Requires="p14">
-            <p:contentPart p14:bwMode="auto" r:id="rId4">
-              <p14:nvContentPartPr>
-                <p14:cNvPr id="6" name="Ink 5">
-                  <a:extLst>
-                    <a:ext uri="{FF2B5EF4-FFF2-40B4-BE49-F238E27FC236}">
-                      <a16:creationId xmlns:a16="http://schemas.microsoft.com/office/drawing/2014/main" id="{28E34B0E-5494-496D-B5E1-39896C0CBD42}"/>
-                    </a:ext>
-                  </a:extLst>
-                </p14:cNvPr>
-                <p14:cNvContentPartPr/>
-                <p14:nvPr/>
-              </p14:nvContentPartPr>
-              <p14:xfrm>
-                <a:off x="3409678" y="1053676"/>
-                <a:ext cx="1237320" cy="701280"/>
-              </p14:xfrm>
-            </p:contentPart>
-          </mc:Choice>
-          <mc:Fallback xmlns="">
-            <p:pic>
-              <p:nvPicPr>
-                <p:cNvPr id="6" name="Ink 5">
-                  <a:extLst>
-                    <a:ext uri="{FF2B5EF4-FFF2-40B4-BE49-F238E27FC236}">
-                      <a16:creationId xmlns:a16="http://schemas.microsoft.com/office/drawing/2014/main" id="{28E34B0E-5494-496D-B5E1-39896C0CBD42}"/>
-                    </a:ext>
-                  </a:extLst>
-                </p:cNvPr>
-                <p:cNvPicPr/>
-                <p:nvPr/>
-              </p:nvPicPr>
-              <p:blipFill>
-                <a:blip r:embed="rId5"/>
-                <a:stretch>
-                  <a:fillRect/>
-                </a:stretch>
-              </p:blipFill>
-              <p:spPr>
-                <a:xfrm>
-                  <a:off x="3400678" y="1045036"/>
-                  <a:ext cx="1254960" cy="718920"/>
-                </a:xfrm>
-                <a:prstGeom prst="rect">
-                  <a:avLst/>
-                </a:prstGeom>
-              </p:spPr>
-            </p:pic>
-          </mc:Fallback>
-        </mc:AlternateContent>
-        <mc:AlternateContent xmlns:mc="http://schemas.openxmlformats.org/markup-compatibility/2006" xmlns:p14="http://schemas.microsoft.com/office/powerpoint/2010/main">
-          <mc:Choice Requires="p14">
-            <p:contentPart p14:bwMode="auto" r:id="rId6">
-              <p14:nvContentPartPr>
-                <p14:cNvPr id="7" name="Ink 6">
-                  <a:extLst>
-                    <a:ext uri="{FF2B5EF4-FFF2-40B4-BE49-F238E27FC236}">
-                      <a16:creationId xmlns:a16="http://schemas.microsoft.com/office/drawing/2014/main" id="{79110ACD-2262-4FC1-BC34-676ED29D6EDD}"/>
-                    </a:ext>
-                  </a:extLst>
-                </p14:cNvPr>
-                <p14:cNvContentPartPr/>
-                <p14:nvPr/>
-              </p14:nvContentPartPr>
-              <p14:xfrm>
-                <a:off x="3172438" y="1576396"/>
-                <a:ext cx="439920" cy="503280"/>
-              </p14:xfrm>
-            </p:contentPart>
-          </mc:Choice>
-          <mc:Fallback xmlns="">
-            <p:pic>
-              <p:nvPicPr>
-                <p:cNvPr id="7" name="Ink 6">
-                  <a:extLst>
-                    <a:ext uri="{FF2B5EF4-FFF2-40B4-BE49-F238E27FC236}">
-                      <a16:creationId xmlns:a16="http://schemas.microsoft.com/office/drawing/2014/main" id="{79110ACD-2262-4FC1-BC34-676ED29D6EDD}"/>
-                    </a:ext>
-                  </a:extLst>
-                </p:cNvPr>
-                <p:cNvPicPr/>
-                <p:nvPr/>
-              </p:nvPicPr>
-              <p:blipFill>
-                <a:blip r:embed="rId7"/>
-                <a:stretch>
-                  <a:fillRect/>
-                </a:stretch>
-              </p:blipFill>
-              <p:spPr>
-                <a:xfrm>
-                  <a:off x="3163438" y="1567756"/>
-                  <a:ext cx="457560" cy="520920"/>
-                </a:xfrm>
-                <a:prstGeom prst="rect">
-                  <a:avLst/>
-                </a:prstGeom>
-              </p:spPr>
-            </p:pic>
-          </mc:Fallback>
-        </mc:AlternateContent>
-      </p:grpSp>
-      <p:grpSp>
-        <p:nvGrpSpPr>
-          <p:cNvPr id="11" name="Group 10">
-            <a:extLst>
-              <a:ext uri="{FF2B5EF4-FFF2-40B4-BE49-F238E27FC236}">
-                <a16:creationId xmlns:a16="http://schemas.microsoft.com/office/drawing/2014/main" id="{E496CB37-95B0-4BDF-853E-E67BCDF61799}"/>
-              </a:ext>
-            </a:extLst>
-          </p:cNvPr>
-          <p:cNvGrpSpPr/>
-          <p:nvPr/>
-        </p:nvGrpSpPr>
-        <p:grpSpPr>
-          <a:xfrm>
-            <a:off x="6195358" y="1063396"/>
-            <a:ext cx="1058040" cy="1261080"/>
-            <a:chOff x="6195358" y="1063396"/>
-            <a:chExt cx="1058040" cy="1261080"/>
-          </a:xfrm>
-        </p:grpSpPr>
-        <mc:AlternateContent xmlns:mc="http://schemas.openxmlformats.org/markup-compatibility/2006" xmlns:p14="http://schemas.microsoft.com/office/powerpoint/2010/main">
-          <mc:Choice Requires="p14">
-            <p:contentPart p14:bwMode="auto" r:id="rId8">
-              <p14:nvContentPartPr>
-                <p14:cNvPr id="9" name="Ink 8">
-                  <a:extLst>
-                    <a:ext uri="{FF2B5EF4-FFF2-40B4-BE49-F238E27FC236}">
-                      <a16:creationId xmlns:a16="http://schemas.microsoft.com/office/drawing/2014/main" id="{01F0BF1A-7AA6-453C-BE71-0547C2030140}"/>
-                    </a:ext>
-                  </a:extLst>
-                </p14:cNvPr>
-                <p14:cNvContentPartPr/>
-                <p14:nvPr/>
-              </p14:nvContentPartPr>
-              <p14:xfrm>
-                <a:off x="6195358" y="1063396"/>
-                <a:ext cx="821520" cy="1091160"/>
-              </p14:xfrm>
-            </p:contentPart>
-          </mc:Choice>
-          <mc:Fallback xmlns="">
-            <p:pic>
-              <p:nvPicPr>
-                <p:cNvPr id="9" name="Ink 8">
-                  <a:extLst>
-                    <a:ext uri="{FF2B5EF4-FFF2-40B4-BE49-F238E27FC236}">
-                      <a16:creationId xmlns:a16="http://schemas.microsoft.com/office/drawing/2014/main" id="{01F0BF1A-7AA6-453C-BE71-0547C2030140}"/>
-                    </a:ext>
-                  </a:extLst>
-                </p:cNvPr>
-                <p:cNvPicPr/>
-                <p:nvPr/>
-              </p:nvPicPr>
-              <p:blipFill>
-                <a:blip r:embed="rId9"/>
-                <a:stretch>
-                  <a:fillRect/>
-                </a:stretch>
-              </p:blipFill>
-              <p:spPr>
-                <a:xfrm>
-                  <a:off x="6186718" y="1054396"/>
-                  <a:ext cx="839160" cy="1108800"/>
-                </a:xfrm>
-                <a:prstGeom prst="rect">
-                  <a:avLst/>
-                </a:prstGeom>
-              </p:spPr>
-            </p:pic>
-          </mc:Fallback>
-        </mc:AlternateContent>
-        <mc:AlternateContent xmlns:mc="http://schemas.openxmlformats.org/markup-compatibility/2006" xmlns:p14="http://schemas.microsoft.com/office/powerpoint/2010/main">
-          <mc:Choice Requires="p14">
-            <p:contentPart p14:bwMode="auto" r:id="rId10">
-              <p14:nvContentPartPr>
-                <p14:cNvPr id="10" name="Ink 9">
-                  <a:extLst>
-                    <a:ext uri="{FF2B5EF4-FFF2-40B4-BE49-F238E27FC236}">
-                      <a16:creationId xmlns:a16="http://schemas.microsoft.com/office/drawing/2014/main" id="{83EFA385-46CC-4B59-BA5E-3DDE0CC3B1F1}"/>
-                    </a:ext>
-                  </a:extLst>
-                </p14:cNvPr>
-                <p14:cNvContentPartPr/>
-                <p14:nvPr/>
-              </p14:nvContentPartPr>
-              <p14:xfrm>
-                <a:off x="6773518" y="2089396"/>
-                <a:ext cx="479880" cy="235080"/>
-              </p14:xfrm>
-            </p:contentPart>
-          </mc:Choice>
-          <mc:Fallback xmlns="">
-            <p:pic>
-              <p:nvPicPr>
-                <p:cNvPr id="10" name="Ink 9">
-                  <a:extLst>
-                    <a:ext uri="{FF2B5EF4-FFF2-40B4-BE49-F238E27FC236}">
-                      <a16:creationId xmlns:a16="http://schemas.microsoft.com/office/drawing/2014/main" id="{83EFA385-46CC-4B59-BA5E-3DDE0CC3B1F1}"/>
-                    </a:ext>
-                  </a:extLst>
-                </p:cNvPr>
-                <p:cNvPicPr/>
-                <p:nvPr/>
-              </p:nvPicPr>
-              <p:blipFill>
-                <a:blip r:embed="rId11"/>
-                <a:stretch>
-                  <a:fillRect/>
-                </a:stretch>
-              </p:blipFill>
-              <p:spPr>
-                <a:xfrm>
-                  <a:off x="6764878" y="2080756"/>
-                  <a:ext cx="497520" cy="252720"/>
-                </a:xfrm>
-                <a:prstGeom prst="rect">
-                  <a:avLst/>
-                </a:prstGeom>
-              </p:spPr>
-            </p:pic>
-          </mc:Fallback>
-        </mc:AlternateContent>
-      </p:grpSp>
       <p:sp>
         <p:nvSpPr>
           <p:cNvPr id="12" name="TextBox 11">
@@ -10909,6 +10450,88 @@
           </a:p>
         </p:txBody>
       </p:sp>
+      <p:cxnSp>
+        <p:nvCxnSpPr>
+          <p:cNvPr id="4" name="Curved Connector 3">
+            <a:extLst>
+              <a:ext uri="{FF2B5EF4-FFF2-40B4-BE49-F238E27FC236}">
+                <a16:creationId xmlns:a16="http://schemas.microsoft.com/office/drawing/2014/main" id="{8A661365-8385-141C-7C9F-B53A7000E0F0}"/>
+              </a:ext>
+            </a:extLst>
+          </p:cNvPr>
+          <p:cNvCxnSpPr>
+            <a:endCxn id="1026" idx="0"/>
+          </p:cNvCxnSpPr>
+          <p:nvPr/>
+        </p:nvCxnSpPr>
+        <p:spPr>
+          <a:xfrm rot="10800000" flipV="1">
+            <a:off x="3470987" y="1197621"/>
+            <a:ext cx="1384234" cy="1228338"/>
+          </a:xfrm>
+          <a:prstGeom prst="curvedConnector2">
+            <a:avLst/>
+          </a:prstGeom>
+          <a:ln>
+            <a:tailEnd type="triangle"/>
+          </a:ln>
+        </p:spPr>
+        <p:style>
+          <a:lnRef idx="1">
+            <a:schemeClr val="accent1"/>
+          </a:lnRef>
+          <a:fillRef idx="0">
+            <a:schemeClr val="accent1"/>
+          </a:fillRef>
+          <a:effectRef idx="0">
+            <a:schemeClr val="accent1"/>
+          </a:effectRef>
+          <a:fontRef idx="minor">
+            <a:schemeClr val="tx1"/>
+          </a:fontRef>
+        </p:style>
+      </p:cxnSp>
+      <p:cxnSp>
+        <p:nvCxnSpPr>
+          <p:cNvPr id="16" name="Curved Connector 15">
+            <a:extLst>
+              <a:ext uri="{FF2B5EF4-FFF2-40B4-BE49-F238E27FC236}">
+                <a16:creationId xmlns:a16="http://schemas.microsoft.com/office/drawing/2014/main" id="{E4490743-5F22-0BA4-C128-BED12FC83F48}"/>
+              </a:ext>
+            </a:extLst>
+          </p:cNvPr>
+          <p:cNvCxnSpPr>
+            <a:endCxn id="5" idx="0"/>
+          </p:cNvCxnSpPr>
+          <p:nvPr/>
+        </p:nvCxnSpPr>
+        <p:spPr>
+          <a:xfrm>
+            <a:off x="5923370" y="1197621"/>
+            <a:ext cx="1357618" cy="1228337"/>
+          </a:xfrm>
+          <a:prstGeom prst="curvedConnector2">
+            <a:avLst/>
+          </a:prstGeom>
+          <a:ln>
+            <a:tailEnd type="triangle"/>
+          </a:ln>
+        </p:spPr>
+        <p:style>
+          <a:lnRef idx="1">
+            <a:schemeClr val="accent1"/>
+          </a:lnRef>
+          <a:fillRef idx="0">
+            <a:schemeClr val="accent1"/>
+          </a:fillRef>
+          <a:effectRef idx="0">
+            <a:schemeClr val="accent1"/>
+          </a:effectRef>
+          <a:fontRef idx="minor">
+            <a:schemeClr val="tx1"/>
+          </a:fontRef>
+        </p:style>
+      </p:cxnSp>
     </p:spTree>
     <p:extLst>
       <p:ext uri="{BB962C8B-B14F-4D97-AF65-F5344CB8AC3E}">
@@ -10939,299 +10562,6 @@
           <a:chExt cx="0" cy="0"/>
         </a:xfrm>
       </p:grpSpPr>
-      <p:pic>
-        <p:nvPicPr>
-          <p:cNvPr id="1030" name="Picture 6">
-            <a:extLst>
-              <a:ext uri="{FF2B5EF4-FFF2-40B4-BE49-F238E27FC236}">
-                <a16:creationId xmlns:a16="http://schemas.microsoft.com/office/drawing/2014/main" id="{624F7108-D25D-4C7F-BF17-77F13A11B021}"/>
-              </a:ext>
-            </a:extLst>
-          </p:cNvPr>
-          <p:cNvPicPr>
-            <a:picLocks noChangeAspect="1" noChangeArrowheads="1"/>
-          </p:cNvPicPr>
-          <p:nvPr/>
-        </p:nvPicPr>
-        <p:blipFill>
-          <a:blip r:embed="rId2">
-            <a:extLst>
-              <a:ext uri="{28A0092B-C50C-407E-A947-70E740481C1C}">
-                <a14:useLocalDpi xmlns:a14="http://schemas.microsoft.com/office/drawing/2010/main" val="0"/>
-              </a:ext>
-            </a:extLst>
-          </a:blip>
-          <a:srcRect/>
-          <a:stretch>
-            <a:fillRect/>
-          </a:stretch>
-        </p:blipFill>
-        <p:spPr bwMode="auto">
-          <a:xfrm>
-            <a:off x="4152706" y="-102638"/>
-            <a:ext cx="2446564" cy="2603241"/>
-          </a:xfrm>
-          <a:prstGeom prst="rect">
-            <a:avLst/>
-          </a:prstGeom>
-          <a:noFill/>
-          <a:extLst>
-            <a:ext uri="{909E8E84-426E-40DD-AFC4-6F175D3DCCD1}">
-              <a14:hiddenFill xmlns:a14="http://schemas.microsoft.com/office/drawing/2010/main">
-                <a:solidFill>
-                  <a:srgbClr val="FFFFFF"/>
-                </a:solidFill>
-              </a14:hiddenFill>
-            </a:ext>
-          </a:extLst>
-        </p:spPr>
-      </p:pic>
-      <p:grpSp>
-        <p:nvGrpSpPr>
-          <p:cNvPr id="8" name="Group 7">
-            <a:extLst>
-              <a:ext uri="{FF2B5EF4-FFF2-40B4-BE49-F238E27FC236}">
-                <a16:creationId xmlns:a16="http://schemas.microsoft.com/office/drawing/2014/main" id="{8A47D6CB-F4D3-4C79-9F92-649AD5EEED3B}"/>
-              </a:ext>
-            </a:extLst>
-          </p:cNvPr>
-          <p:cNvGrpSpPr/>
-          <p:nvPr/>
-        </p:nvGrpSpPr>
-        <p:grpSpPr>
-          <a:xfrm>
-            <a:off x="3172438" y="1053676"/>
-            <a:ext cx="1474560" cy="1026000"/>
-            <a:chOff x="3172438" y="1053676"/>
-            <a:chExt cx="1474560" cy="1026000"/>
-          </a:xfrm>
-        </p:grpSpPr>
-        <mc:AlternateContent xmlns:mc="http://schemas.openxmlformats.org/markup-compatibility/2006" xmlns:p14="http://schemas.microsoft.com/office/powerpoint/2010/main">
-          <mc:Choice Requires="p14">
-            <p:contentPart p14:bwMode="auto" r:id="rId3">
-              <p14:nvContentPartPr>
-                <p14:cNvPr id="6" name="Ink 5">
-                  <a:extLst>
-                    <a:ext uri="{FF2B5EF4-FFF2-40B4-BE49-F238E27FC236}">
-                      <a16:creationId xmlns:a16="http://schemas.microsoft.com/office/drawing/2014/main" id="{28E34B0E-5494-496D-B5E1-39896C0CBD42}"/>
-                    </a:ext>
-                  </a:extLst>
-                </p14:cNvPr>
-                <p14:cNvContentPartPr/>
-                <p14:nvPr/>
-              </p14:nvContentPartPr>
-              <p14:xfrm>
-                <a:off x="3409678" y="1053676"/>
-                <a:ext cx="1237320" cy="701280"/>
-              </p14:xfrm>
-            </p:contentPart>
-          </mc:Choice>
-          <mc:Fallback xmlns="">
-            <p:pic>
-              <p:nvPicPr>
-                <p:cNvPr id="6" name="Ink 5">
-                  <a:extLst>
-                    <a:ext uri="{FF2B5EF4-FFF2-40B4-BE49-F238E27FC236}">
-                      <a16:creationId xmlns:a16="http://schemas.microsoft.com/office/drawing/2014/main" id="{28E34B0E-5494-496D-B5E1-39896C0CBD42}"/>
-                    </a:ext>
-                  </a:extLst>
-                </p:cNvPr>
-                <p:cNvPicPr/>
-                <p:nvPr/>
-              </p:nvPicPr>
-              <p:blipFill>
-                <a:blip r:embed="rId4"/>
-                <a:stretch>
-                  <a:fillRect/>
-                </a:stretch>
-              </p:blipFill>
-              <p:spPr>
-                <a:xfrm>
-                  <a:off x="3400681" y="1044676"/>
-                  <a:ext cx="1254955" cy="718920"/>
-                </a:xfrm>
-                <a:prstGeom prst="rect">
-                  <a:avLst/>
-                </a:prstGeom>
-              </p:spPr>
-            </p:pic>
-          </mc:Fallback>
-        </mc:AlternateContent>
-        <mc:AlternateContent xmlns:mc="http://schemas.openxmlformats.org/markup-compatibility/2006" xmlns:p14="http://schemas.microsoft.com/office/powerpoint/2010/main">
-          <mc:Choice Requires="p14">
-            <p:contentPart p14:bwMode="auto" r:id="rId5">
-              <p14:nvContentPartPr>
-                <p14:cNvPr id="7" name="Ink 6">
-                  <a:extLst>
-                    <a:ext uri="{FF2B5EF4-FFF2-40B4-BE49-F238E27FC236}">
-                      <a16:creationId xmlns:a16="http://schemas.microsoft.com/office/drawing/2014/main" id="{79110ACD-2262-4FC1-BC34-676ED29D6EDD}"/>
-                    </a:ext>
-                  </a:extLst>
-                </p14:cNvPr>
-                <p14:cNvContentPartPr/>
-                <p14:nvPr/>
-              </p14:nvContentPartPr>
-              <p14:xfrm>
-                <a:off x="3172438" y="1576396"/>
-                <a:ext cx="439920" cy="503280"/>
-              </p14:xfrm>
-            </p:contentPart>
-          </mc:Choice>
-          <mc:Fallback xmlns="">
-            <p:pic>
-              <p:nvPicPr>
-                <p:cNvPr id="7" name="Ink 6">
-                  <a:extLst>
-                    <a:ext uri="{FF2B5EF4-FFF2-40B4-BE49-F238E27FC236}">
-                      <a16:creationId xmlns:a16="http://schemas.microsoft.com/office/drawing/2014/main" id="{79110ACD-2262-4FC1-BC34-676ED29D6EDD}"/>
-                    </a:ext>
-                  </a:extLst>
-                </p:cNvPr>
-                <p:cNvPicPr/>
-                <p:nvPr/>
-              </p:nvPicPr>
-              <p:blipFill>
-                <a:blip r:embed="rId6"/>
-                <a:stretch>
-                  <a:fillRect/>
-                </a:stretch>
-              </p:blipFill>
-              <p:spPr>
-                <a:xfrm>
-                  <a:off x="3163438" y="1567390"/>
-                  <a:ext cx="457560" cy="520933"/>
-                </a:xfrm>
-                <a:prstGeom prst="rect">
-                  <a:avLst/>
-                </a:prstGeom>
-              </p:spPr>
-            </p:pic>
-          </mc:Fallback>
-        </mc:AlternateContent>
-      </p:grpSp>
-      <p:grpSp>
-        <p:nvGrpSpPr>
-          <p:cNvPr id="11" name="Group 10">
-            <a:extLst>
-              <a:ext uri="{FF2B5EF4-FFF2-40B4-BE49-F238E27FC236}">
-                <a16:creationId xmlns:a16="http://schemas.microsoft.com/office/drawing/2014/main" id="{E496CB37-95B0-4BDF-853E-E67BCDF61799}"/>
-              </a:ext>
-            </a:extLst>
-          </p:cNvPr>
-          <p:cNvGrpSpPr/>
-          <p:nvPr/>
-        </p:nvGrpSpPr>
-        <p:grpSpPr>
-          <a:xfrm>
-            <a:off x="6195358" y="1063396"/>
-            <a:ext cx="1058040" cy="1261080"/>
-            <a:chOff x="6195358" y="1063396"/>
-            <a:chExt cx="1058040" cy="1261080"/>
-          </a:xfrm>
-        </p:grpSpPr>
-        <mc:AlternateContent xmlns:mc="http://schemas.openxmlformats.org/markup-compatibility/2006" xmlns:p14="http://schemas.microsoft.com/office/powerpoint/2010/main">
-          <mc:Choice Requires="p14">
-            <p:contentPart p14:bwMode="auto" r:id="rId7">
-              <p14:nvContentPartPr>
-                <p14:cNvPr id="9" name="Ink 8">
-                  <a:extLst>
-                    <a:ext uri="{FF2B5EF4-FFF2-40B4-BE49-F238E27FC236}">
-                      <a16:creationId xmlns:a16="http://schemas.microsoft.com/office/drawing/2014/main" id="{01F0BF1A-7AA6-453C-BE71-0547C2030140}"/>
-                    </a:ext>
-                  </a:extLst>
-                </p14:cNvPr>
-                <p14:cNvContentPartPr/>
-                <p14:nvPr/>
-              </p14:nvContentPartPr>
-              <p14:xfrm>
-                <a:off x="6195358" y="1063396"/>
-                <a:ext cx="821520" cy="1091160"/>
-              </p14:xfrm>
-            </p:contentPart>
-          </mc:Choice>
-          <mc:Fallback xmlns="">
-            <p:pic>
-              <p:nvPicPr>
-                <p:cNvPr id="9" name="Ink 8">
-                  <a:extLst>
-                    <a:ext uri="{FF2B5EF4-FFF2-40B4-BE49-F238E27FC236}">
-                      <a16:creationId xmlns:a16="http://schemas.microsoft.com/office/drawing/2014/main" id="{01F0BF1A-7AA6-453C-BE71-0547C2030140}"/>
-                    </a:ext>
-                  </a:extLst>
-                </p:cNvPr>
-                <p:cNvPicPr/>
-                <p:nvPr/>
-              </p:nvPicPr>
-              <p:blipFill>
-                <a:blip r:embed="rId8"/>
-                <a:stretch>
-                  <a:fillRect/>
-                </a:stretch>
-              </p:blipFill>
-              <p:spPr>
-                <a:xfrm>
-                  <a:off x="6186358" y="1054396"/>
-                  <a:ext cx="839160" cy="1108800"/>
-                </a:xfrm>
-                <a:prstGeom prst="rect">
-                  <a:avLst/>
-                </a:prstGeom>
-              </p:spPr>
-            </p:pic>
-          </mc:Fallback>
-        </mc:AlternateContent>
-        <mc:AlternateContent xmlns:mc="http://schemas.openxmlformats.org/markup-compatibility/2006" xmlns:p14="http://schemas.microsoft.com/office/powerpoint/2010/main">
-          <mc:Choice Requires="p14">
-            <p:contentPart p14:bwMode="auto" r:id="rId9">
-              <p14:nvContentPartPr>
-                <p14:cNvPr id="10" name="Ink 9">
-                  <a:extLst>
-                    <a:ext uri="{FF2B5EF4-FFF2-40B4-BE49-F238E27FC236}">
-                      <a16:creationId xmlns:a16="http://schemas.microsoft.com/office/drawing/2014/main" id="{83EFA385-46CC-4B59-BA5E-3DDE0CC3B1F1}"/>
-                    </a:ext>
-                  </a:extLst>
-                </p14:cNvPr>
-                <p14:cNvContentPartPr/>
-                <p14:nvPr/>
-              </p14:nvContentPartPr>
-              <p14:xfrm>
-                <a:off x="6773518" y="2089396"/>
-                <a:ext cx="479880" cy="235080"/>
-              </p14:xfrm>
-            </p:contentPart>
-          </mc:Choice>
-          <mc:Fallback xmlns="">
-            <p:pic>
-              <p:nvPicPr>
-                <p:cNvPr id="10" name="Ink 9">
-                  <a:extLst>
-                    <a:ext uri="{FF2B5EF4-FFF2-40B4-BE49-F238E27FC236}">
-                      <a16:creationId xmlns:a16="http://schemas.microsoft.com/office/drawing/2014/main" id="{83EFA385-46CC-4B59-BA5E-3DDE0CC3B1F1}"/>
-                    </a:ext>
-                  </a:extLst>
-                </p:cNvPr>
-                <p:cNvPicPr/>
-                <p:nvPr/>
-              </p:nvPicPr>
-              <p:blipFill>
-                <a:blip r:embed="rId10"/>
-                <a:stretch>
-                  <a:fillRect/>
-                </a:stretch>
-              </p:blipFill>
-              <p:spPr>
-                <a:xfrm>
-                  <a:off x="6764518" y="2080396"/>
-                  <a:ext cx="497520" cy="252720"/>
-                </a:xfrm>
-                <a:prstGeom prst="rect">
-                  <a:avLst/>
-                </a:prstGeom>
-              </p:spPr>
-            </p:pic>
-          </mc:Fallback>
-        </mc:AlternateContent>
-      </p:grpSp>
       <p:sp>
         <p:nvSpPr>
           <p:cNvPr id="12" name="TextBox 11">
@@ -11352,7 +10682,7 @@
           <p:nvPr/>
         </p:nvPicPr>
         <p:blipFill>
-          <a:blip r:embed="rId11">
+          <a:blip r:embed="rId2">
             <a:extLst>
               <a:ext uri="{28A0092B-C50C-407E-A947-70E740481C1C}">
                 <a14:useLocalDpi xmlns:a14="http://schemas.microsoft.com/office/drawing/2010/main" val="0"/>
@@ -11399,7 +10729,7 @@
           <p:nvPr/>
         </p:nvPicPr>
         <p:blipFill>
-          <a:blip r:embed="rId12">
+          <a:blip r:embed="rId3">
             <a:extLst>
               <a:ext uri="{28A0092B-C50C-407E-A947-70E740481C1C}">
                 <a14:useLocalDpi xmlns:a14="http://schemas.microsoft.com/office/drawing/2010/main" val="0"/>
@@ -11431,12 +10761,59 @@
           </a:extLst>
         </p:spPr>
       </p:pic>
-      <p:sp>
-        <p:nvSpPr>
-          <p:cNvPr id="15" name="TextBox 14">
+      <p:pic>
+        <p:nvPicPr>
+          <p:cNvPr id="2" name="Picture 6">
             <a:extLst>
               <a:ext uri="{FF2B5EF4-FFF2-40B4-BE49-F238E27FC236}">
-                <a16:creationId xmlns:a16="http://schemas.microsoft.com/office/drawing/2014/main" id="{B3C25A6C-9677-48E8-8A7C-E65D75CD628A}"/>
+                <a16:creationId xmlns:a16="http://schemas.microsoft.com/office/drawing/2014/main" id="{580B11A9-C2D5-7942-DF06-B8E10FBC5030}"/>
+              </a:ext>
+            </a:extLst>
+          </p:cNvPr>
+          <p:cNvPicPr>
+            <a:picLocks noChangeAspect="1" noChangeArrowheads="1"/>
+          </p:cNvPicPr>
+          <p:nvPr/>
+        </p:nvPicPr>
+        <p:blipFill>
+          <a:blip r:embed="rId4">
+            <a:extLst>
+              <a:ext uri="{28A0092B-C50C-407E-A947-70E740481C1C}">
+                <a14:useLocalDpi xmlns:a14="http://schemas.microsoft.com/office/drawing/2010/main" val="0"/>
+              </a:ext>
+            </a:extLst>
+          </a:blip>
+          <a:srcRect/>
+          <a:stretch>
+            <a:fillRect/>
+          </a:stretch>
+        </p:blipFill>
+        <p:spPr bwMode="auto">
+          <a:xfrm>
+            <a:off x="4152706" y="-102638"/>
+            <a:ext cx="2446564" cy="2603241"/>
+          </a:xfrm>
+          <a:prstGeom prst="rect">
+            <a:avLst/>
+          </a:prstGeom>
+          <a:noFill/>
+          <a:extLst>
+            <a:ext uri="{909E8E84-426E-40DD-AFC4-6F175D3DCCD1}">
+              <a14:hiddenFill xmlns:a14="http://schemas.microsoft.com/office/drawing/2010/main">
+                <a:solidFill>
+                  <a:srgbClr val="FFFFFF"/>
+                </a:solidFill>
+              </a14:hiddenFill>
+            </a:ext>
+          </a:extLst>
+        </p:spPr>
+      </p:pic>
+      <p:sp>
+        <p:nvSpPr>
+          <p:cNvPr id="3" name="TextBox 2">
+            <a:extLst>
+              <a:ext uri="{FF2B5EF4-FFF2-40B4-BE49-F238E27FC236}">
+                <a16:creationId xmlns:a16="http://schemas.microsoft.com/office/drawing/2014/main" id="{2647FBF0-B4E8-BFAC-2491-509357FB398B}"/>
               </a:ext>
             </a:extLst>
           </p:cNvPr>
@@ -11466,6 +10843,84 @@
           </a:p>
         </p:txBody>
       </p:sp>
+      <p:cxnSp>
+        <p:nvCxnSpPr>
+          <p:cNvPr id="4" name="Curved Connector 3">
+            <a:extLst>
+              <a:ext uri="{FF2B5EF4-FFF2-40B4-BE49-F238E27FC236}">
+                <a16:creationId xmlns:a16="http://schemas.microsoft.com/office/drawing/2014/main" id="{B949A306-0486-99F3-5AFE-35787EBDA8ED}"/>
+              </a:ext>
+            </a:extLst>
+          </p:cNvPr>
+          <p:cNvCxnSpPr/>
+          <p:nvPr/>
+        </p:nvCxnSpPr>
+        <p:spPr>
+          <a:xfrm rot="10800000" flipV="1">
+            <a:off x="3470987" y="1197621"/>
+            <a:ext cx="1384234" cy="1228338"/>
+          </a:xfrm>
+          <a:prstGeom prst="curvedConnector2">
+            <a:avLst/>
+          </a:prstGeom>
+          <a:ln>
+            <a:tailEnd type="triangle"/>
+          </a:ln>
+        </p:spPr>
+        <p:style>
+          <a:lnRef idx="1">
+            <a:schemeClr val="accent1"/>
+          </a:lnRef>
+          <a:fillRef idx="0">
+            <a:schemeClr val="accent1"/>
+          </a:fillRef>
+          <a:effectRef idx="0">
+            <a:schemeClr val="accent1"/>
+          </a:effectRef>
+          <a:fontRef idx="minor">
+            <a:schemeClr val="tx1"/>
+          </a:fontRef>
+        </p:style>
+      </p:cxnSp>
+      <p:cxnSp>
+        <p:nvCxnSpPr>
+          <p:cNvPr id="5" name="Curved Connector 4">
+            <a:extLst>
+              <a:ext uri="{FF2B5EF4-FFF2-40B4-BE49-F238E27FC236}">
+                <a16:creationId xmlns:a16="http://schemas.microsoft.com/office/drawing/2014/main" id="{7B9902C7-52EB-C3FC-8D56-6F834FE01FAF}"/>
+              </a:ext>
+            </a:extLst>
+          </p:cNvPr>
+          <p:cNvCxnSpPr/>
+          <p:nvPr/>
+        </p:nvCxnSpPr>
+        <p:spPr>
+          <a:xfrm>
+            <a:off x="5923370" y="1197621"/>
+            <a:ext cx="1357618" cy="1228337"/>
+          </a:xfrm>
+          <a:prstGeom prst="curvedConnector2">
+            <a:avLst/>
+          </a:prstGeom>
+          <a:ln>
+            <a:tailEnd type="triangle"/>
+          </a:ln>
+        </p:spPr>
+        <p:style>
+          <a:lnRef idx="1">
+            <a:schemeClr val="accent1"/>
+          </a:lnRef>
+          <a:fillRef idx="0">
+            <a:schemeClr val="accent1"/>
+          </a:fillRef>
+          <a:effectRef idx="0">
+            <a:schemeClr val="accent1"/>
+          </a:effectRef>
+          <a:fontRef idx="minor">
+            <a:schemeClr val="tx1"/>
+          </a:fontRef>
+        </p:style>
+      </p:cxnSp>
     </p:spTree>
     <p:extLst>
       <p:ext uri="{BB962C8B-B14F-4D97-AF65-F5344CB8AC3E}">

</xml_diff>